<commit_message>
Paper update to improve clarity and flow.
</commit_message>
<xml_diff>
--- a/papers/dallin_skouson/SpyDrNetFlow.pptx
+++ b/papers/dallin_skouson/SpyDrNetFlow.pptx
@@ -1071,7 +1071,7 @@
 <dgm:dataModel xmlns:dgm="http://schemas.openxmlformats.org/drawingml/2006/diagram" xmlns:a="http://schemas.openxmlformats.org/drawingml/2006/main">
   <dgm:ptLst>
     <dgm:pt modelId="{814D9219-B480-4108-A671-4E94489B26F8}" type="doc">
-      <dgm:prSet loTypeId="urn:microsoft.com/office/officeart/2005/8/layout/chevron1" loCatId="process" qsTypeId="urn:microsoft.com/office/officeart/2005/8/quickstyle/simple1" qsCatId="simple" csTypeId="urn:microsoft.com/office/officeart/2005/8/colors/accent0_1" csCatId="mainScheme" phldr="1"/>
+      <dgm:prSet loTypeId="urn:microsoft.com/office/officeart/2005/8/layout/lProcess1" loCatId="process" qsTypeId="urn:microsoft.com/office/officeart/2005/8/quickstyle/simple1" qsCatId="simple" csTypeId="urn:microsoft.com/office/officeart/2005/8/colors/accent0_1" csCatId="mainScheme" phldr="1"/>
       <dgm:spPr/>
     </dgm:pt>
     <dgm:pt modelId="{8D3489DE-B65F-4E47-A396-7EB84473545D}">
@@ -1310,7 +1310,7 @@
         </a:p>
       </dgm:t>
     </dgm:pt>
-    <dgm:pt modelId="{611A4C62-4178-47A9-A27C-4D1ADB78F2CC}" type="pres">
+    <dgm:pt modelId="{BACEC9F2-20FC-41EB-B2D8-05979B759285}" type="pres">
       <dgm:prSet presAssocID="{814D9219-B480-4108-A671-4E94489B26F8}" presName="Name0" presStyleCnt="0">
         <dgm:presLayoutVars>
           <dgm:dir/>
@@ -1320,112 +1320,106 @@
       </dgm:prSet>
       <dgm:spPr/>
     </dgm:pt>
-    <dgm:pt modelId="{A9418CE6-F44B-4BA0-9A4A-C9AF6528DA20}" type="pres">
-      <dgm:prSet presAssocID="{8D3489DE-B65F-4E47-A396-7EB84473545D}" presName="parTxOnly" presStyleLbl="node1" presStyleIdx="0" presStyleCnt="6">
-        <dgm:presLayoutVars>
-          <dgm:chMax val="0"/>
-          <dgm:chPref val="0"/>
-          <dgm:bulletEnabled val="1"/>
-        </dgm:presLayoutVars>
-      </dgm:prSet>
+    <dgm:pt modelId="{643CAA24-1602-44DD-BFC4-22928C709C1C}" type="pres">
+      <dgm:prSet presAssocID="{8D3489DE-B65F-4E47-A396-7EB84473545D}" presName="vertFlow" presStyleCnt="0"/>
       <dgm:spPr/>
     </dgm:pt>
-    <dgm:pt modelId="{FAE16C1F-420C-4171-80C5-F2D6AEADD5B3}" type="pres">
-      <dgm:prSet presAssocID="{20E08DB6-A08B-4D1F-8FD9-36AEC1CA8C49}" presName="parTxOnlySpace" presStyleCnt="0"/>
+    <dgm:pt modelId="{A032623A-53CA-4590-960B-94B8D1FA852A}" type="pres">
+      <dgm:prSet presAssocID="{8D3489DE-B65F-4E47-A396-7EB84473545D}" presName="header" presStyleLbl="node1" presStyleIdx="0" presStyleCnt="6"/>
       <dgm:spPr/>
     </dgm:pt>
-    <dgm:pt modelId="{4573F355-D35F-44AB-B5C2-B6CB6698A71D}" type="pres">
-      <dgm:prSet presAssocID="{5937BA0F-9861-4863-995E-610D8E41DC93}" presName="parTxOnly" presStyleLbl="node1" presStyleIdx="1" presStyleCnt="6">
-        <dgm:presLayoutVars>
-          <dgm:chMax val="0"/>
-          <dgm:chPref val="0"/>
-          <dgm:bulletEnabled val="1"/>
-        </dgm:presLayoutVars>
-      </dgm:prSet>
+    <dgm:pt modelId="{CD2070C4-DDAC-4CEE-B77D-A0AAEEB3C177}" type="pres">
+      <dgm:prSet presAssocID="{8D3489DE-B65F-4E47-A396-7EB84473545D}" presName="hSp" presStyleCnt="0"/>
       <dgm:spPr/>
     </dgm:pt>
-    <dgm:pt modelId="{7102C90E-B512-4CE3-B447-F067096CE2A5}" type="pres">
-      <dgm:prSet presAssocID="{E7036EB7-4B39-42D8-AF35-626CB20670B8}" presName="parTxOnlySpace" presStyleCnt="0"/>
+    <dgm:pt modelId="{C97C13BA-10DE-4E00-875E-4D7B6EE37464}" type="pres">
+      <dgm:prSet presAssocID="{5937BA0F-9861-4863-995E-610D8E41DC93}" presName="vertFlow" presStyleCnt="0"/>
       <dgm:spPr/>
     </dgm:pt>
-    <dgm:pt modelId="{4F971579-C15E-4BB1-A7A7-97DA9A116006}" type="pres">
-      <dgm:prSet presAssocID="{31BA1C23-965F-4A08-866C-60F465527D31}" presName="parTxOnly" presStyleLbl="node1" presStyleIdx="2" presStyleCnt="6">
-        <dgm:presLayoutVars>
-          <dgm:chMax val="0"/>
-          <dgm:chPref val="0"/>
-          <dgm:bulletEnabled val="1"/>
-        </dgm:presLayoutVars>
-      </dgm:prSet>
+    <dgm:pt modelId="{B0C67399-4A7A-4567-B0F9-4EB84DBEB1CD}" type="pres">
+      <dgm:prSet presAssocID="{5937BA0F-9861-4863-995E-610D8E41DC93}" presName="header" presStyleLbl="node1" presStyleIdx="1" presStyleCnt="6"/>
       <dgm:spPr/>
     </dgm:pt>
-    <dgm:pt modelId="{13CF2BCB-7C8E-4434-857E-96C8EF1AC7FF}" type="pres">
-      <dgm:prSet presAssocID="{31340B1F-2108-4780-BE4F-75F46081EC54}" presName="parTxOnlySpace" presStyleCnt="0"/>
+    <dgm:pt modelId="{FE80DCBA-645F-492A-B237-AD4AE9167E37}" type="pres">
+      <dgm:prSet presAssocID="{5937BA0F-9861-4863-995E-610D8E41DC93}" presName="hSp" presStyleCnt="0"/>
       <dgm:spPr/>
     </dgm:pt>
-    <dgm:pt modelId="{22F3282C-6FF2-4801-A274-02FF02B8327D}" type="pres">
-      <dgm:prSet presAssocID="{57C84856-79E7-4BC8-BBA9-6444F5EB7A28}" presName="parTxOnly" presStyleLbl="node1" presStyleIdx="3" presStyleCnt="6">
-        <dgm:presLayoutVars>
-          <dgm:chMax val="0"/>
-          <dgm:chPref val="0"/>
-          <dgm:bulletEnabled val="1"/>
-        </dgm:presLayoutVars>
-      </dgm:prSet>
+    <dgm:pt modelId="{4F7FDAA9-72F1-4C4E-8FC3-1841925FC0A5}" type="pres">
+      <dgm:prSet presAssocID="{31BA1C23-965F-4A08-866C-60F465527D31}" presName="vertFlow" presStyleCnt="0"/>
       <dgm:spPr/>
     </dgm:pt>
-    <dgm:pt modelId="{64CDAB66-AE82-4FC7-986E-4AF918EDFC1B}" type="pres">
-      <dgm:prSet presAssocID="{B34530A6-2982-4844-9926-6EDBB6A9984F}" presName="parTxOnlySpace" presStyleCnt="0"/>
+    <dgm:pt modelId="{8AE6C759-23F3-4D68-8A92-C9CD1CCAFC46}" type="pres">
+      <dgm:prSet presAssocID="{31BA1C23-965F-4A08-866C-60F465527D31}" presName="header" presStyleLbl="node1" presStyleIdx="2" presStyleCnt="6"/>
       <dgm:spPr/>
     </dgm:pt>
-    <dgm:pt modelId="{EDFBC494-9FC8-4D56-81D4-C34EC4B766FC}" type="pres">
-      <dgm:prSet presAssocID="{33341C1B-01FA-4A4F-8079-907A98550C61}" presName="parTxOnly" presStyleLbl="node1" presStyleIdx="4" presStyleCnt="6">
-        <dgm:presLayoutVars>
-          <dgm:chMax val="0"/>
-          <dgm:chPref val="0"/>
-          <dgm:bulletEnabled val="1"/>
-        </dgm:presLayoutVars>
-      </dgm:prSet>
+    <dgm:pt modelId="{EAB80F29-B5ED-4D73-AD9F-BCEDBB153762}" type="pres">
+      <dgm:prSet presAssocID="{31BA1C23-965F-4A08-866C-60F465527D31}" presName="hSp" presStyleCnt="0"/>
       <dgm:spPr/>
     </dgm:pt>
-    <dgm:pt modelId="{06322151-0593-4398-96B8-76B84DB472AC}" type="pres">
-      <dgm:prSet presAssocID="{25A7162E-52D5-403A-B35F-32DFA78099C0}" presName="parTxOnlySpace" presStyleCnt="0"/>
+    <dgm:pt modelId="{A1EDE5BF-3336-47E3-99D6-D69D1E828570}" type="pres">
+      <dgm:prSet presAssocID="{57C84856-79E7-4BC8-BBA9-6444F5EB7A28}" presName="vertFlow" presStyleCnt="0"/>
       <dgm:spPr/>
     </dgm:pt>
-    <dgm:pt modelId="{3E22DBB6-69B6-4FD9-B01F-C4219EF1B864}" type="pres">
-      <dgm:prSet presAssocID="{47B719C7-DC03-4FB8-A2C3-8C7AE9278697}" presName="parTxOnly" presStyleLbl="node1" presStyleIdx="5" presStyleCnt="6">
-        <dgm:presLayoutVars>
-          <dgm:chMax val="0"/>
-          <dgm:chPref val="0"/>
-          <dgm:bulletEnabled val="1"/>
-        </dgm:presLayoutVars>
-      </dgm:prSet>
+    <dgm:pt modelId="{A3E8692D-7786-4E0C-AB24-6B95704E0AC4}" type="pres">
+      <dgm:prSet presAssocID="{57C84856-79E7-4BC8-BBA9-6444F5EB7A28}" presName="header" presStyleLbl="node1" presStyleIdx="3" presStyleCnt="6"/>
+      <dgm:spPr/>
+    </dgm:pt>
+    <dgm:pt modelId="{573FC0D5-0EEC-4E53-B425-2649E1C7B913}" type="pres">
+      <dgm:prSet presAssocID="{57C84856-79E7-4BC8-BBA9-6444F5EB7A28}" presName="hSp" presStyleCnt="0"/>
+      <dgm:spPr/>
+    </dgm:pt>
+    <dgm:pt modelId="{918AA7BA-56A5-41DE-809E-99D09946C16C}" type="pres">
+      <dgm:prSet presAssocID="{33341C1B-01FA-4A4F-8079-907A98550C61}" presName="vertFlow" presStyleCnt="0"/>
+      <dgm:spPr/>
+    </dgm:pt>
+    <dgm:pt modelId="{9C2F49E6-30EC-4FC8-B8BF-3DB9901D06CA}" type="pres">
+      <dgm:prSet presAssocID="{33341C1B-01FA-4A4F-8079-907A98550C61}" presName="header" presStyleLbl="node1" presStyleIdx="4" presStyleCnt="6"/>
+      <dgm:spPr/>
+    </dgm:pt>
+    <dgm:pt modelId="{9E027A7A-6AA5-489C-A4C3-1EE9720FC6B3}" type="pres">
+      <dgm:prSet presAssocID="{33341C1B-01FA-4A4F-8079-907A98550C61}" presName="hSp" presStyleCnt="0"/>
+      <dgm:spPr/>
+    </dgm:pt>
+    <dgm:pt modelId="{2F6C8D58-9328-4DB1-8ACB-C38333ED5BB5}" type="pres">
+      <dgm:prSet presAssocID="{47B719C7-DC03-4FB8-A2C3-8C7AE9278697}" presName="vertFlow" presStyleCnt="0"/>
+      <dgm:spPr/>
+    </dgm:pt>
+    <dgm:pt modelId="{28DD7189-59CB-4A0F-A1DB-FD6BDA082E9B}" type="pres">
+      <dgm:prSet presAssocID="{47B719C7-DC03-4FB8-A2C3-8C7AE9278697}" presName="header" presStyleLbl="node1" presStyleIdx="5" presStyleCnt="6"/>
       <dgm:spPr/>
     </dgm:pt>
   </dgm:ptLst>
   <dgm:cxnLst>
     <dgm:cxn modelId="{F5B46B06-3DA2-46D8-AB9D-9F4655C0212C}" srcId="{814D9219-B480-4108-A671-4E94489B26F8}" destId="{31BA1C23-965F-4A08-866C-60F465527D31}" srcOrd="2" destOrd="0" parTransId="{F7B04D4A-736F-450B-8CCC-72E064F16098}" sibTransId="{31340B1F-2108-4780-BE4F-75F46081EC54}"/>
-    <dgm:cxn modelId="{AF7E9D15-8C43-4764-88F9-B259B00A8A5B}" type="presOf" srcId="{8D3489DE-B65F-4E47-A396-7EB84473545D}" destId="{A9418CE6-F44B-4BA0-9A4A-C9AF6528DA20}" srcOrd="0" destOrd="0" presId="urn:microsoft.com/office/officeart/2005/8/layout/chevron1"/>
+    <dgm:cxn modelId="{00DF4707-E041-4215-8BC5-49FC24BA2EA0}" type="presOf" srcId="{8D3489DE-B65F-4E47-A396-7EB84473545D}" destId="{A032623A-53CA-4590-960B-94B8D1FA852A}" srcOrd="0" destOrd="0" presId="urn:microsoft.com/office/officeart/2005/8/layout/lProcess1"/>
     <dgm:cxn modelId="{4D8F4A20-59F7-497D-8581-015BA79BEA6A}" srcId="{814D9219-B480-4108-A671-4E94489B26F8}" destId="{5937BA0F-9861-4863-995E-610D8E41DC93}" srcOrd="1" destOrd="0" parTransId="{46C498AF-DA9F-4185-BC0D-7B686DAFD6B4}" sibTransId="{E7036EB7-4B39-42D8-AF35-626CB20670B8}"/>
+    <dgm:cxn modelId="{14450221-C002-42A4-93C9-FB0801D34657}" type="presOf" srcId="{33341C1B-01FA-4A4F-8079-907A98550C61}" destId="{9C2F49E6-30EC-4FC8-B8BF-3DB9901D06CA}" srcOrd="0" destOrd="0" presId="urn:microsoft.com/office/officeart/2005/8/layout/lProcess1"/>
+    <dgm:cxn modelId="{A7999621-6709-47B6-84C6-20ADECDD5345}" type="presOf" srcId="{57C84856-79E7-4BC8-BBA9-6444F5EB7A28}" destId="{A3E8692D-7786-4E0C-AB24-6B95704E0AC4}" srcOrd="0" destOrd="0" presId="urn:microsoft.com/office/officeart/2005/8/layout/lProcess1"/>
     <dgm:cxn modelId="{0958E94E-2B20-46FF-B341-76FF35A85ECC}" srcId="{814D9219-B480-4108-A671-4E94489B26F8}" destId="{57C84856-79E7-4BC8-BBA9-6444F5EB7A28}" srcOrd="3" destOrd="0" parTransId="{C7FD1690-AC56-41A5-B5D8-614E3B13BF41}" sibTransId="{B34530A6-2982-4844-9926-6EDBB6A9984F}"/>
-    <dgm:cxn modelId="{328DE783-0DA8-4883-AF42-297C0F0073AB}" type="presOf" srcId="{814D9219-B480-4108-A671-4E94489B26F8}" destId="{611A4C62-4178-47A9-A27C-4D1ADB78F2CC}" srcOrd="0" destOrd="0" presId="urn:microsoft.com/office/officeart/2005/8/layout/chevron1"/>
+    <dgm:cxn modelId="{CCBB0171-7479-4F1F-9F00-655EAB67E7F5}" type="presOf" srcId="{5937BA0F-9861-4863-995E-610D8E41DC93}" destId="{B0C67399-4A7A-4567-B0F9-4EB84DBEB1CD}" srcOrd="0" destOrd="0" presId="urn:microsoft.com/office/officeart/2005/8/layout/lProcess1"/>
+    <dgm:cxn modelId="{466F5D80-DCC8-494B-BBED-7FA1B47368A8}" type="presOf" srcId="{31BA1C23-965F-4A08-866C-60F465527D31}" destId="{8AE6C759-23F3-4D68-8A92-C9CD1CCAFC46}" srcOrd="0" destOrd="0" presId="urn:microsoft.com/office/officeart/2005/8/layout/lProcess1"/>
+    <dgm:cxn modelId="{49928383-F4E3-4621-B54F-5680433197AE}" type="presOf" srcId="{814D9219-B480-4108-A671-4E94489B26F8}" destId="{BACEC9F2-20FC-41EB-B2D8-05979B759285}" srcOrd="0" destOrd="0" presId="urn:microsoft.com/office/officeart/2005/8/layout/lProcess1"/>
     <dgm:cxn modelId="{65B4C19A-3DEE-4F65-9A2A-DE558273E758}" srcId="{814D9219-B480-4108-A671-4E94489B26F8}" destId="{33341C1B-01FA-4A4F-8079-907A98550C61}" srcOrd="4" destOrd="0" parTransId="{B6256648-67E5-4504-A5C3-F512B83873D3}" sibTransId="{25A7162E-52D5-403A-B35F-32DFA78099C0}"/>
-    <dgm:cxn modelId="{58E6D8B9-AB49-45B3-A769-22EF6CE5B390}" type="presOf" srcId="{47B719C7-DC03-4FB8-A2C3-8C7AE9278697}" destId="{3E22DBB6-69B6-4FD9-B01F-C4219EF1B864}" srcOrd="0" destOrd="0" presId="urn:microsoft.com/office/officeart/2005/8/layout/chevron1"/>
-    <dgm:cxn modelId="{02C08CCA-D3AD-4DD7-9F95-F906DFE65B94}" type="presOf" srcId="{31BA1C23-965F-4A08-866C-60F465527D31}" destId="{4F971579-C15E-4BB1-A7A7-97DA9A116006}" srcOrd="0" destOrd="0" presId="urn:microsoft.com/office/officeart/2005/8/layout/chevron1"/>
+    <dgm:cxn modelId="{A9F86DAA-2646-479D-8C02-DD5ED61CDA87}" type="presOf" srcId="{47B719C7-DC03-4FB8-A2C3-8C7AE9278697}" destId="{28DD7189-59CB-4A0F-A1DB-FD6BDA082E9B}" srcOrd="0" destOrd="0" presId="urn:microsoft.com/office/officeart/2005/8/layout/lProcess1"/>
     <dgm:cxn modelId="{3B81CFD4-DD8E-4A98-BF5E-B17A95F8EB46}" srcId="{814D9219-B480-4108-A671-4E94489B26F8}" destId="{47B719C7-DC03-4FB8-A2C3-8C7AE9278697}" srcOrd="5" destOrd="0" parTransId="{96D746BA-6B61-4D6C-8699-D2EF89C6244E}" sibTransId="{7A0270CA-4176-4D19-A25A-271D33DDE0CD}"/>
-    <dgm:cxn modelId="{FB5736E1-B806-469C-B79C-2F5BEE085D94}" type="presOf" srcId="{5937BA0F-9861-4863-995E-610D8E41DC93}" destId="{4573F355-D35F-44AB-B5C2-B6CB6698A71D}" srcOrd="0" destOrd="0" presId="urn:microsoft.com/office/officeart/2005/8/layout/chevron1"/>
-    <dgm:cxn modelId="{441F25F0-C9EC-44D7-B9BB-C0CA48C1FD21}" type="presOf" srcId="{57C84856-79E7-4BC8-BBA9-6444F5EB7A28}" destId="{22F3282C-6FF2-4801-A274-02FF02B8327D}" srcOrd="0" destOrd="0" presId="urn:microsoft.com/office/officeart/2005/8/layout/chevron1"/>
     <dgm:cxn modelId="{DF0E62F7-45CD-4711-9CC8-DD454E03F139}" srcId="{814D9219-B480-4108-A671-4E94489B26F8}" destId="{8D3489DE-B65F-4E47-A396-7EB84473545D}" srcOrd="0" destOrd="0" parTransId="{8BFD4492-00C8-44E5-97B5-30C19538609F}" sibTransId="{20E08DB6-A08B-4D1F-8FD9-36AEC1CA8C49}"/>
-    <dgm:cxn modelId="{75914FF8-B8F0-4400-8E8F-12B7B1965416}" type="presOf" srcId="{33341C1B-01FA-4A4F-8079-907A98550C61}" destId="{EDFBC494-9FC8-4D56-81D4-C34EC4B766FC}" srcOrd="0" destOrd="0" presId="urn:microsoft.com/office/officeart/2005/8/layout/chevron1"/>
-    <dgm:cxn modelId="{18E9A92C-9CBE-4879-B264-2641D6C9F93E}" type="presParOf" srcId="{611A4C62-4178-47A9-A27C-4D1ADB78F2CC}" destId="{A9418CE6-F44B-4BA0-9A4A-C9AF6528DA20}" srcOrd="0" destOrd="0" presId="urn:microsoft.com/office/officeart/2005/8/layout/chevron1"/>
-    <dgm:cxn modelId="{C09B6FEA-8F41-4E0B-9F4E-C604A57820F1}" type="presParOf" srcId="{611A4C62-4178-47A9-A27C-4D1ADB78F2CC}" destId="{FAE16C1F-420C-4171-80C5-F2D6AEADD5B3}" srcOrd="1" destOrd="0" presId="urn:microsoft.com/office/officeart/2005/8/layout/chevron1"/>
-    <dgm:cxn modelId="{1FE6B0B0-0770-45B9-B340-97B02028A9D5}" type="presParOf" srcId="{611A4C62-4178-47A9-A27C-4D1ADB78F2CC}" destId="{4573F355-D35F-44AB-B5C2-B6CB6698A71D}" srcOrd="2" destOrd="0" presId="urn:microsoft.com/office/officeart/2005/8/layout/chevron1"/>
-    <dgm:cxn modelId="{6E336244-7B19-4EE7-AEEA-1E4EDEA1F7A9}" type="presParOf" srcId="{611A4C62-4178-47A9-A27C-4D1ADB78F2CC}" destId="{7102C90E-B512-4CE3-B447-F067096CE2A5}" srcOrd="3" destOrd="0" presId="urn:microsoft.com/office/officeart/2005/8/layout/chevron1"/>
-    <dgm:cxn modelId="{CAD4D024-5885-4E18-B327-D6AA3E5FEA83}" type="presParOf" srcId="{611A4C62-4178-47A9-A27C-4D1ADB78F2CC}" destId="{4F971579-C15E-4BB1-A7A7-97DA9A116006}" srcOrd="4" destOrd="0" presId="urn:microsoft.com/office/officeart/2005/8/layout/chevron1"/>
-    <dgm:cxn modelId="{69A4B915-FABB-4174-8563-1B24C2640C03}" type="presParOf" srcId="{611A4C62-4178-47A9-A27C-4D1ADB78F2CC}" destId="{13CF2BCB-7C8E-4434-857E-96C8EF1AC7FF}" srcOrd="5" destOrd="0" presId="urn:microsoft.com/office/officeart/2005/8/layout/chevron1"/>
-    <dgm:cxn modelId="{B2C3BEB6-C273-498A-9A0E-4D99B38B21C9}" type="presParOf" srcId="{611A4C62-4178-47A9-A27C-4D1ADB78F2CC}" destId="{22F3282C-6FF2-4801-A274-02FF02B8327D}" srcOrd="6" destOrd="0" presId="urn:microsoft.com/office/officeart/2005/8/layout/chevron1"/>
-    <dgm:cxn modelId="{4F99F0D6-74E4-4D0D-BBDA-24FDA812FE63}" type="presParOf" srcId="{611A4C62-4178-47A9-A27C-4D1ADB78F2CC}" destId="{64CDAB66-AE82-4FC7-986E-4AF918EDFC1B}" srcOrd="7" destOrd="0" presId="urn:microsoft.com/office/officeart/2005/8/layout/chevron1"/>
-    <dgm:cxn modelId="{8291C5DC-DF7D-4A00-A452-666BB0285909}" type="presParOf" srcId="{611A4C62-4178-47A9-A27C-4D1ADB78F2CC}" destId="{EDFBC494-9FC8-4D56-81D4-C34EC4B766FC}" srcOrd="8" destOrd="0" presId="urn:microsoft.com/office/officeart/2005/8/layout/chevron1"/>
-    <dgm:cxn modelId="{8C9DEC15-65F0-4637-9239-CAB8593337D4}" type="presParOf" srcId="{611A4C62-4178-47A9-A27C-4D1ADB78F2CC}" destId="{06322151-0593-4398-96B8-76B84DB472AC}" srcOrd="9" destOrd="0" presId="urn:microsoft.com/office/officeart/2005/8/layout/chevron1"/>
-    <dgm:cxn modelId="{CE6032B9-D859-4E55-9037-9C7616FF79FC}" type="presParOf" srcId="{611A4C62-4178-47A9-A27C-4D1ADB78F2CC}" destId="{3E22DBB6-69B6-4FD9-B01F-C4219EF1B864}" srcOrd="10" destOrd="0" presId="urn:microsoft.com/office/officeart/2005/8/layout/chevron1"/>
+    <dgm:cxn modelId="{4A304C6E-135A-4BD2-9935-1F58DF871D0F}" type="presParOf" srcId="{BACEC9F2-20FC-41EB-B2D8-05979B759285}" destId="{643CAA24-1602-44DD-BFC4-22928C709C1C}" srcOrd="0" destOrd="0" presId="urn:microsoft.com/office/officeart/2005/8/layout/lProcess1"/>
+    <dgm:cxn modelId="{3D1CC090-0BC2-4ADC-A9A6-A45408ED5CFD}" type="presParOf" srcId="{643CAA24-1602-44DD-BFC4-22928C709C1C}" destId="{A032623A-53CA-4590-960B-94B8D1FA852A}" srcOrd="0" destOrd="0" presId="urn:microsoft.com/office/officeart/2005/8/layout/lProcess1"/>
+    <dgm:cxn modelId="{CED65BA3-862A-49B4-9BCF-F80660721840}" type="presParOf" srcId="{BACEC9F2-20FC-41EB-B2D8-05979B759285}" destId="{CD2070C4-DDAC-4CEE-B77D-A0AAEEB3C177}" srcOrd="1" destOrd="0" presId="urn:microsoft.com/office/officeart/2005/8/layout/lProcess1"/>
+    <dgm:cxn modelId="{83345715-6606-4AC2-94DF-289DF8A90CF9}" type="presParOf" srcId="{BACEC9F2-20FC-41EB-B2D8-05979B759285}" destId="{C97C13BA-10DE-4E00-875E-4D7B6EE37464}" srcOrd="2" destOrd="0" presId="urn:microsoft.com/office/officeart/2005/8/layout/lProcess1"/>
+    <dgm:cxn modelId="{D73A02AA-CB4B-4F43-A54E-18230D7C1812}" type="presParOf" srcId="{C97C13BA-10DE-4E00-875E-4D7B6EE37464}" destId="{B0C67399-4A7A-4567-B0F9-4EB84DBEB1CD}" srcOrd="0" destOrd="0" presId="urn:microsoft.com/office/officeart/2005/8/layout/lProcess1"/>
+    <dgm:cxn modelId="{E0A1BF18-39CD-45E1-81FE-0E77E55F6956}" type="presParOf" srcId="{BACEC9F2-20FC-41EB-B2D8-05979B759285}" destId="{FE80DCBA-645F-492A-B237-AD4AE9167E37}" srcOrd="3" destOrd="0" presId="urn:microsoft.com/office/officeart/2005/8/layout/lProcess1"/>
+    <dgm:cxn modelId="{5D81BD68-3168-4F34-A229-75C11DD8C1F6}" type="presParOf" srcId="{BACEC9F2-20FC-41EB-B2D8-05979B759285}" destId="{4F7FDAA9-72F1-4C4E-8FC3-1841925FC0A5}" srcOrd="4" destOrd="0" presId="urn:microsoft.com/office/officeart/2005/8/layout/lProcess1"/>
+    <dgm:cxn modelId="{B1D09554-05C6-4995-B231-E8FD91A3D565}" type="presParOf" srcId="{4F7FDAA9-72F1-4C4E-8FC3-1841925FC0A5}" destId="{8AE6C759-23F3-4D68-8A92-C9CD1CCAFC46}" srcOrd="0" destOrd="0" presId="urn:microsoft.com/office/officeart/2005/8/layout/lProcess1"/>
+    <dgm:cxn modelId="{404E8DB6-51A2-4695-96A2-76256BAB5DC8}" type="presParOf" srcId="{BACEC9F2-20FC-41EB-B2D8-05979B759285}" destId="{EAB80F29-B5ED-4D73-AD9F-BCEDBB153762}" srcOrd="5" destOrd="0" presId="urn:microsoft.com/office/officeart/2005/8/layout/lProcess1"/>
+    <dgm:cxn modelId="{8373AD5B-4025-4E8E-9E22-91449FCA49B6}" type="presParOf" srcId="{BACEC9F2-20FC-41EB-B2D8-05979B759285}" destId="{A1EDE5BF-3336-47E3-99D6-D69D1E828570}" srcOrd="6" destOrd="0" presId="urn:microsoft.com/office/officeart/2005/8/layout/lProcess1"/>
+    <dgm:cxn modelId="{F059E433-5F0A-439C-A189-041525167EFC}" type="presParOf" srcId="{A1EDE5BF-3336-47E3-99D6-D69D1E828570}" destId="{A3E8692D-7786-4E0C-AB24-6B95704E0AC4}" srcOrd="0" destOrd="0" presId="urn:microsoft.com/office/officeart/2005/8/layout/lProcess1"/>
+    <dgm:cxn modelId="{86991A2E-F508-4B61-B7E1-9FC9C4DA47F9}" type="presParOf" srcId="{BACEC9F2-20FC-41EB-B2D8-05979B759285}" destId="{573FC0D5-0EEC-4E53-B425-2649E1C7B913}" srcOrd="7" destOrd="0" presId="urn:microsoft.com/office/officeart/2005/8/layout/lProcess1"/>
+    <dgm:cxn modelId="{E60F61D4-002F-44A0-AB00-F104172240A7}" type="presParOf" srcId="{BACEC9F2-20FC-41EB-B2D8-05979B759285}" destId="{918AA7BA-56A5-41DE-809E-99D09946C16C}" srcOrd="8" destOrd="0" presId="urn:microsoft.com/office/officeart/2005/8/layout/lProcess1"/>
+    <dgm:cxn modelId="{CDA2C33A-6080-4BFF-AA28-38A335A0EE56}" type="presParOf" srcId="{918AA7BA-56A5-41DE-809E-99D09946C16C}" destId="{9C2F49E6-30EC-4FC8-B8BF-3DB9901D06CA}" srcOrd="0" destOrd="0" presId="urn:microsoft.com/office/officeart/2005/8/layout/lProcess1"/>
+    <dgm:cxn modelId="{D52086BF-47D1-4174-B2AB-401624C7991E}" type="presParOf" srcId="{BACEC9F2-20FC-41EB-B2D8-05979B759285}" destId="{9E027A7A-6AA5-489C-A4C3-1EE9720FC6B3}" srcOrd="9" destOrd="0" presId="urn:microsoft.com/office/officeart/2005/8/layout/lProcess1"/>
+    <dgm:cxn modelId="{42816C5A-78C0-475D-AADE-8BDFAFED4A5A}" type="presParOf" srcId="{BACEC9F2-20FC-41EB-B2D8-05979B759285}" destId="{2F6C8D58-9328-4DB1-8ACB-C38333ED5BB5}" srcOrd="10" destOrd="0" presId="urn:microsoft.com/office/officeart/2005/8/layout/lProcess1"/>
+    <dgm:cxn modelId="{ECF7B8E0-42CE-4729-AEDE-871AFAD83DE0}" type="presParOf" srcId="{2F6C8D58-9328-4DB1-8ACB-C38333ED5BB5}" destId="{28DD7189-59CB-4A0F-A1DB-FD6BDA082E9B}" srcOrd="0" destOrd="0" presId="urn:microsoft.com/office/officeart/2005/8/layout/lProcess1"/>
   </dgm:cxnLst>
   <dgm:bg/>
   <dgm:whole/>
@@ -1445,18 +1439,20 @@
       <dsp:cNvGrpSpPr/>
     </dsp:nvGrpSpPr>
     <dsp:grpSpPr/>
-    <dsp:sp modelId="{A9418CE6-F44B-4BA0-9A4A-C9AF6528DA20}">
+    <dsp:sp modelId="{A032623A-53CA-4590-960B-94B8D1FA852A}">
       <dsp:nvSpPr>
         <dsp:cNvPr id="0" name=""/>
         <dsp:cNvSpPr/>
       </dsp:nvSpPr>
       <dsp:spPr>
         <a:xfrm>
-          <a:off x="4371" y="2219674"/>
-          <a:ext cx="1626319" cy="650527"/>
+          <a:off x="5835" y="2378112"/>
+          <a:ext cx="1334601" cy="333650"/>
         </a:xfrm>
-        <a:prstGeom prst="chevron">
-          <a:avLst/>
+        <a:prstGeom prst="roundRect">
+          <a:avLst>
+            <a:gd name="adj" fmla="val 10000"/>
+          </a:avLst>
         </a:prstGeom>
         <a:solidFill>
           <a:schemeClr val="lt1">
@@ -1495,12 +1491,12 @@
         </a:fontRef>
       </dsp:style>
       <dsp:txBody>
-        <a:bodyPr spcFirstLastPara="0" vert="horz" wrap="square" lIns="48006" tIns="16002" rIns="16002" bIns="16002" numCol="1" spcCol="1270" anchor="ctr" anchorCtr="0">
+        <a:bodyPr spcFirstLastPara="0" vert="horz" wrap="square" lIns="12700" tIns="12700" rIns="12700" bIns="12700" numCol="1" spcCol="1270" anchor="ctr" anchorCtr="0">
           <a:noAutofit/>
         </a:bodyPr>
         <a:lstStyle/>
         <a:p>
-          <a:pPr marL="0" lvl="0" indent="0" algn="ctr" defTabSz="533400">
+          <a:pPr marL="0" lvl="0" indent="0" algn="ctr" defTabSz="444500">
             <a:lnSpc>
               <a:spcPct val="90000"/>
             </a:lnSpc>
@@ -1513,31 +1509,33 @@
             <a:buNone/>
           </a:pPr>
           <a:r>
-            <a:rPr lang="en-US" sz="1200" kern="1200" dirty="0">
+            <a:rPr lang="en-US" sz="1000" kern="1200" dirty="0">
               <a:latin typeface="Arial"/>
             </a:rPr>
             <a:t>HDL</a:t>
           </a:r>
-          <a:endParaRPr lang="en-US" sz="1200" kern="1200" dirty="0"/>
+          <a:endParaRPr lang="en-US" sz="1000" kern="1200" dirty="0"/>
         </a:p>
       </dsp:txBody>
       <dsp:txXfrm>
-        <a:off x="329635" y="2219674"/>
-        <a:ext cx="975792" cy="650527"/>
+        <a:off x="15607" y="2387884"/>
+        <a:ext cx="1315057" cy="314106"/>
       </dsp:txXfrm>
     </dsp:sp>
-    <dsp:sp modelId="{4573F355-D35F-44AB-B5C2-B6CB6698A71D}">
+    <dsp:sp modelId="{B0C67399-4A7A-4567-B0F9-4EB84DBEB1CD}">
       <dsp:nvSpPr>
         <dsp:cNvPr id="0" name=""/>
         <dsp:cNvSpPr/>
       </dsp:nvSpPr>
       <dsp:spPr>
         <a:xfrm>
-          <a:off x="1468059" y="2219674"/>
-          <a:ext cx="1626319" cy="650527"/>
+          <a:off x="1527280" y="2378112"/>
+          <a:ext cx="1334601" cy="333650"/>
         </a:xfrm>
-        <a:prstGeom prst="chevron">
-          <a:avLst/>
+        <a:prstGeom prst="roundRect">
+          <a:avLst>
+            <a:gd name="adj" fmla="val 10000"/>
+          </a:avLst>
         </a:prstGeom>
         <a:solidFill>
           <a:schemeClr val="lt1">
@@ -1576,12 +1574,12 @@
         </a:fontRef>
       </dsp:style>
       <dsp:txBody>
-        <a:bodyPr spcFirstLastPara="0" vert="horz" wrap="square" lIns="48006" tIns="16002" rIns="16002" bIns="16002" numCol="1" spcCol="1270" anchor="ctr" anchorCtr="0">
+        <a:bodyPr spcFirstLastPara="0" vert="horz" wrap="square" lIns="12700" tIns="12700" rIns="12700" bIns="12700" numCol="1" spcCol="1270" anchor="ctr" anchorCtr="0">
           <a:noAutofit/>
         </a:bodyPr>
         <a:lstStyle/>
         <a:p>
-          <a:pPr marL="0" lvl="0" indent="0" algn="ctr" defTabSz="533400">
+          <a:pPr marL="0" lvl="0" indent="0" algn="ctr" defTabSz="444500">
             <a:lnSpc>
               <a:spcPct val="90000"/>
             </a:lnSpc>
@@ -1594,31 +1592,33 @@
             <a:buNone/>
           </a:pPr>
           <a:r>
-            <a:rPr lang="en-US" sz="1200" kern="1200" dirty="0">
+            <a:rPr lang="en-US" sz="1000" kern="1200" dirty="0">
               <a:latin typeface="Arial"/>
             </a:rPr>
             <a:t>Synthesis</a:t>
           </a:r>
-          <a:endParaRPr lang="en-US" sz="1200" kern="1200" dirty="0"/>
+          <a:endParaRPr lang="en-US" sz="1000" kern="1200" dirty="0"/>
         </a:p>
       </dsp:txBody>
       <dsp:txXfrm>
-        <a:off x="1793323" y="2219674"/>
-        <a:ext cx="975792" cy="650527"/>
+        <a:off x="1537052" y="2387884"/>
+        <a:ext cx="1315057" cy="314106"/>
       </dsp:txXfrm>
     </dsp:sp>
-    <dsp:sp modelId="{4F971579-C15E-4BB1-A7A7-97DA9A116006}">
+    <dsp:sp modelId="{8AE6C759-23F3-4D68-8A92-C9CD1CCAFC46}">
       <dsp:nvSpPr>
         <dsp:cNvPr id="0" name=""/>
         <dsp:cNvSpPr/>
       </dsp:nvSpPr>
       <dsp:spPr>
         <a:xfrm>
-          <a:off x="2931746" y="2219674"/>
-          <a:ext cx="1626319" cy="650527"/>
+          <a:off x="3048726" y="2378112"/>
+          <a:ext cx="1334601" cy="333650"/>
         </a:xfrm>
-        <a:prstGeom prst="chevron">
-          <a:avLst/>
+        <a:prstGeom prst="roundRect">
+          <a:avLst>
+            <a:gd name="adj" fmla="val 10000"/>
+          </a:avLst>
         </a:prstGeom>
         <a:solidFill>
           <a:schemeClr val="lt1">
@@ -1657,12 +1657,12 @@
         </a:fontRef>
       </dsp:style>
       <dsp:txBody>
-        <a:bodyPr spcFirstLastPara="0" vert="horz" wrap="square" lIns="48006" tIns="16002" rIns="16002" bIns="16002" numCol="1" spcCol="1270" anchor="ctr" anchorCtr="0">
+        <a:bodyPr spcFirstLastPara="0" vert="horz" wrap="square" lIns="12700" tIns="12700" rIns="12700" bIns="12700" numCol="1" spcCol="1270" anchor="ctr" anchorCtr="0">
           <a:noAutofit/>
         </a:bodyPr>
         <a:lstStyle/>
         <a:p>
-          <a:pPr marL="0" lvl="0" indent="0" algn="ctr" defTabSz="533400" rtl="0">
+          <a:pPr marL="0" lvl="0" indent="0" algn="ctr" defTabSz="444500" rtl="0">
             <a:lnSpc>
               <a:spcPct val="90000"/>
             </a:lnSpc>
@@ -1675,31 +1675,33 @@
             <a:buNone/>
           </a:pPr>
           <a:r>
-            <a:rPr lang="en-US" sz="1200" kern="1200" dirty="0">
+            <a:rPr lang="en-US" sz="1000" kern="1200" dirty="0">
               <a:latin typeface="Arial"/>
             </a:rPr>
             <a:t> Netlist</a:t>
           </a:r>
-          <a:endParaRPr lang="en-US" sz="1200" kern="1200" dirty="0"/>
+          <a:endParaRPr lang="en-US" sz="1000" kern="1200" dirty="0"/>
         </a:p>
       </dsp:txBody>
       <dsp:txXfrm>
-        <a:off x="3257010" y="2219674"/>
-        <a:ext cx="975792" cy="650527"/>
+        <a:off x="3058498" y="2387884"/>
+        <a:ext cx="1315057" cy="314106"/>
       </dsp:txXfrm>
     </dsp:sp>
-    <dsp:sp modelId="{22F3282C-6FF2-4801-A274-02FF02B8327D}">
+    <dsp:sp modelId="{A3E8692D-7786-4E0C-AB24-6B95704E0AC4}">
       <dsp:nvSpPr>
         <dsp:cNvPr id="0" name=""/>
         <dsp:cNvSpPr/>
       </dsp:nvSpPr>
       <dsp:spPr>
         <a:xfrm>
-          <a:off x="4395433" y="2219674"/>
-          <a:ext cx="1626319" cy="650527"/>
+          <a:off x="4570171" y="2378112"/>
+          <a:ext cx="1334601" cy="333650"/>
         </a:xfrm>
-        <a:prstGeom prst="chevron">
-          <a:avLst/>
+        <a:prstGeom prst="roundRect">
+          <a:avLst>
+            <a:gd name="adj" fmla="val 10000"/>
+          </a:avLst>
         </a:prstGeom>
         <a:solidFill>
           <a:schemeClr val="lt1">
@@ -1738,12 +1740,12 @@
         </a:fontRef>
       </dsp:style>
       <dsp:txBody>
-        <a:bodyPr spcFirstLastPara="0" vert="horz" wrap="square" lIns="48006" tIns="16002" rIns="16002" bIns="16002" numCol="1" spcCol="1270" anchor="ctr" anchorCtr="0">
+        <a:bodyPr spcFirstLastPara="0" vert="horz" wrap="square" lIns="12700" tIns="12700" rIns="12700" bIns="12700" numCol="1" spcCol="1270" anchor="ctr" anchorCtr="0">
           <a:noAutofit/>
         </a:bodyPr>
         <a:lstStyle/>
         <a:p>
-          <a:pPr marL="0" lvl="0" indent="0" algn="ctr" defTabSz="533400" rtl="0">
+          <a:pPr marL="0" lvl="0" indent="0" algn="ctr" defTabSz="444500" rtl="0">
             <a:lnSpc>
               <a:spcPct val="90000"/>
             </a:lnSpc>
@@ -1756,7 +1758,7 @@
             <a:buNone/>
           </a:pPr>
           <a:r>
-            <a:rPr lang="en-US" sz="1200" kern="1200" dirty="0">
+            <a:rPr lang="en-US" sz="1000" kern="1200" dirty="0">
               <a:latin typeface="Arial"/>
             </a:rPr>
             <a:t>SpyDrNet</a:t>
@@ -1764,22 +1766,24 @@
         </a:p>
       </dsp:txBody>
       <dsp:txXfrm>
-        <a:off x="4720697" y="2219674"/>
-        <a:ext cx="975792" cy="650527"/>
+        <a:off x="4579943" y="2387884"/>
+        <a:ext cx="1315057" cy="314106"/>
       </dsp:txXfrm>
     </dsp:sp>
-    <dsp:sp modelId="{EDFBC494-9FC8-4D56-81D4-C34EC4B766FC}">
+    <dsp:sp modelId="{9C2F49E6-30EC-4FC8-B8BF-3DB9901D06CA}">
       <dsp:nvSpPr>
         <dsp:cNvPr id="0" name=""/>
         <dsp:cNvSpPr/>
       </dsp:nvSpPr>
       <dsp:spPr>
         <a:xfrm>
-          <a:off x="5859120" y="2219674"/>
-          <a:ext cx="1626319" cy="650527"/>
+          <a:off x="6091617" y="2378112"/>
+          <a:ext cx="1334601" cy="333650"/>
         </a:xfrm>
-        <a:prstGeom prst="chevron">
-          <a:avLst/>
+        <a:prstGeom prst="roundRect">
+          <a:avLst>
+            <a:gd name="adj" fmla="val 10000"/>
+          </a:avLst>
         </a:prstGeom>
         <a:solidFill>
           <a:schemeClr val="lt1">
@@ -1818,12 +1822,12 @@
         </a:fontRef>
       </dsp:style>
       <dsp:txBody>
-        <a:bodyPr spcFirstLastPara="0" vert="horz" wrap="square" lIns="48006" tIns="16002" rIns="16002" bIns="16002" numCol="1" spcCol="1270" anchor="ctr" anchorCtr="0">
+        <a:bodyPr spcFirstLastPara="0" vert="horz" wrap="square" lIns="12700" tIns="12700" rIns="12700" bIns="12700" numCol="1" spcCol="1270" anchor="ctr" anchorCtr="0">
           <a:noAutofit/>
         </a:bodyPr>
         <a:lstStyle/>
         <a:p>
-          <a:pPr marL="0" lvl="0" indent="0" algn="ctr" defTabSz="533400" rtl="0">
+          <a:pPr marL="0" lvl="0" indent="0" algn="ctr" defTabSz="444500" rtl="0">
             <a:lnSpc>
               <a:spcPct val="90000"/>
             </a:lnSpc>
@@ -1836,31 +1840,33 @@
             <a:buNone/>
           </a:pPr>
           <a:r>
-            <a:rPr lang="en-US" sz="1200" kern="1200" dirty="0">
+            <a:rPr lang="en-US" sz="1000" kern="1200" dirty="0">
               <a:latin typeface="Arial"/>
             </a:rPr>
             <a:t>Transformed Netlist</a:t>
           </a:r>
-          <a:endParaRPr lang="en-US" sz="1200" kern="1200" dirty="0"/>
+          <a:endParaRPr lang="en-US" sz="1000" kern="1200" dirty="0"/>
         </a:p>
       </dsp:txBody>
       <dsp:txXfrm>
-        <a:off x="6184384" y="2219674"/>
-        <a:ext cx="975792" cy="650527"/>
+        <a:off x="6101389" y="2387884"/>
+        <a:ext cx="1315057" cy="314106"/>
       </dsp:txXfrm>
     </dsp:sp>
-    <dsp:sp modelId="{3E22DBB6-69B6-4FD9-B01F-C4219EF1B864}">
+    <dsp:sp modelId="{28DD7189-59CB-4A0F-A1DB-FD6BDA082E9B}">
       <dsp:nvSpPr>
         <dsp:cNvPr id="0" name=""/>
         <dsp:cNvSpPr/>
       </dsp:nvSpPr>
       <dsp:spPr>
         <a:xfrm>
-          <a:off x="7322808" y="2219674"/>
-          <a:ext cx="1626319" cy="650527"/>
+          <a:off x="7613062" y="2378112"/>
+          <a:ext cx="1334601" cy="333650"/>
         </a:xfrm>
-        <a:prstGeom prst="chevron">
-          <a:avLst/>
+        <a:prstGeom prst="roundRect">
+          <a:avLst>
+            <a:gd name="adj" fmla="val 10000"/>
+          </a:avLst>
         </a:prstGeom>
         <a:solidFill>
           <a:schemeClr val="lt1">
@@ -1899,12 +1905,12 @@
         </a:fontRef>
       </dsp:style>
       <dsp:txBody>
-        <a:bodyPr spcFirstLastPara="0" vert="horz" wrap="square" lIns="48006" tIns="16002" rIns="16002" bIns="16002" numCol="1" spcCol="1270" anchor="ctr" anchorCtr="0">
+        <a:bodyPr spcFirstLastPara="0" vert="horz" wrap="square" lIns="12700" tIns="12700" rIns="12700" bIns="12700" numCol="1" spcCol="1270" anchor="ctr" anchorCtr="0">
           <a:noAutofit/>
         </a:bodyPr>
         <a:lstStyle/>
         <a:p>
-          <a:pPr marL="0" lvl="0" indent="0" algn="ctr" defTabSz="533400" rtl="0">
+          <a:pPr marL="0" lvl="0" indent="0" algn="ctr" defTabSz="444500" rtl="0">
             <a:lnSpc>
               <a:spcPct val="90000"/>
             </a:lnSpc>
@@ -1917,7 +1923,7 @@
             <a:buNone/>
           </a:pPr>
           <a:r>
-            <a:rPr lang="en-US" sz="1200" kern="1200" dirty="0">
+            <a:rPr lang="en-US" sz="1000" kern="1200" dirty="0">
               <a:latin typeface="Arial"/>
             </a:rPr>
             <a:t>Generate Hardware Files</a:t>
@@ -1925,8 +1931,8 @@
         </a:p>
       </dsp:txBody>
       <dsp:txXfrm>
-        <a:off x="7648072" y="2219674"/>
-        <a:ext cx="975792" cy="650527"/>
+        <a:off x="7622834" y="2387884"/>
+        <a:ext cx="1315057" cy="314106"/>
       </dsp:txXfrm>
     </dsp:sp>
   </dsp:spTree>
@@ -1934,15 +1940,43 @@
 </file>
 
 <file path=ppt/diagrams/layout1.xml><?xml version="1.0" encoding="utf-8"?>
-<dgm:layoutDef xmlns:dgm="http://schemas.openxmlformats.org/drawingml/2006/diagram" xmlns:a="http://schemas.openxmlformats.org/drawingml/2006/main" uniqueId="urn:microsoft.com/office/officeart/2005/8/layout/chevron1">
+<dgm:layoutDef xmlns:dgm="http://schemas.openxmlformats.org/drawingml/2006/diagram" xmlns:a="http://schemas.openxmlformats.org/drawingml/2006/main" uniqueId="urn:microsoft.com/office/officeart/2005/8/layout/lProcess1">
   <dgm:title val=""/>
   <dgm:desc val=""/>
   <dgm:catLst>
-    <dgm:cat type="process" pri="9000"/>
+    <dgm:cat type="process" pri="15000"/>
   </dgm:catLst>
-  <dgm:sampData useDef="1">
+  <dgm:sampData>
     <dgm:dataModel>
-      <dgm:ptLst/>
+      <dgm:ptLst>
+        <dgm:pt modelId="0" type="doc"/>
+        <dgm:pt modelId="1">
+          <dgm:prSet phldr="1"/>
+        </dgm:pt>
+        <dgm:pt modelId="2">
+          <dgm:prSet phldr="1"/>
+        </dgm:pt>
+        <dgm:pt modelId="21">
+          <dgm:prSet phldr="1"/>
+        </dgm:pt>
+        <dgm:pt modelId="22">
+          <dgm:prSet phldr="1"/>
+        </dgm:pt>
+        <dgm:pt modelId="3">
+          <dgm:prSet phldr="1"/>
+        </dgm:pt>
+        <dgm:pt modelId="31">
+          <dgm:prSet phldr="1"/>
+        </dgm:pt>
+      </dgm:ptLst>
+      <dgm:cxnLst>
+        <dgm:cxn modelId="4" srcId="0" destId="1" srcOrd="0" destOrd="0"/>
+        <dgm:cxn modelId="5" srcId="0" destId="2" srcOrd="0" destOrd="0"/>
+        <dgm:cxn modelId="6" srcId="1" destId="3" srcOrd="1" destOrd="0"/>
+        <dgm:cxn modelId="23" srcId="2" destId="21" srcOrd="0" destOrd="0"/>
+        <dgm:cxn modelId="24" srcId="2" destId="22" srcOrd="1" destOrd="0"/>
+        <dgm:cxn modelId="33" srcId="1" destId="31" srcOrd="0" destOrd="0"/>
+      </dgm:cxnLst>
       <dgm:bg/>
       <dgm:whole/>
     </dgm:dataModel>
@@ -1952,11 +1986,15 @@
       <dgm:ptLst>
         <dgm:pt modelId="0" type="doc"/>
         <dgm:pt modelId="1"/>
+        <dgm:pt modelId="11"/>
         <dgm:pt modelId="2"/>
+        <dgm:pt modelId="22"/>
       </dgm:ptLst>
       <dgm:cxnLst>
         <dgm:cxn modelId="3" srcId="0" destId="1" srcOrd="0" destOrd="0"/>
-        <dgm:cxn modelId="4" srcId="0" destId="2" srcOrd="1" destOrd="0"/>
+        <dgm:cxn modelId="4" srcId="0" destId="2" srcOrd="0" destOrd="0"/>
+        <dgm:cxn modelId="5" srcId="1" destId="11" srcOrd="0" destOrd="0"/>
+        <dgm:cxn modelId="6" srcId="2" destId="22" srcOrd="0" destOrd="0"/>
       </dgm:cxnLst>
       <dgm:bg/>
       <dgm:whole/>
@@ -1967,15 +2005,23 @@
       <dgm:ptLst>
         <dgm:pt modelId="0" type="doc"/>
         <dgm:pt modelId="1"/>
+        <dgm:pt modelId="11"/>
         <dgm:pt modelId="2"/>
+        <dgm:pt modelId="21"/>
         <dgm:pt modelId="3"/>
+        <dgm:pt modelId="31"/>
         <dgm:pt modelId="4"/>
+        <dgm:pt modelId="41"/>
       </dgm:ptLst>
       <dgm:cxnLst>
         <dgm:cxn modelId="5" srcId="0" destId="1" srcOrd="0" destOrd="0"/>
         <dgm:cxn modelId="6" srcId="0" destId="2" srcOrd="1" destOrd="0"/>
         <dgm:cxn modelId="7" srcId="0" destId="3" srcOrd="2" destOrd="0"/>
         <dgm:cxn modelId="8" srcId="0" destId="4" srcOrd="3" destOrd="0"/>
+        <dgm:cxn modelId="51" srcId="1" destId="11" srcOrd="0" destOrd="0"/>
+        <dgm:cxn modelId="61" srcId="2" destId="21" srcOrd="0" destOrd="0"/>
+        <dgm:cxn modelId="71" srcId="3" destId="31" srcOrd="0" destOrd="0"/>
+        <dgm:cxn modelId="81" srcId="4" destId="41" srcOrd="0" destOrd="0"/>
       </dgm:cxnLst>
       <dgm:bg/>
       <dgm:whole/>
@@ -1989,11 +2035,21 @@
     </dgm:varLst>
     <dgm:choose name="Name1">
       <dgm:if name="Name2" func="var" arg="dir" op="equ" val="norm">
-        <dgm:alg type="lin"/>
+        <dgm:alg type="lin">
+          <dgm:param type="linDir" val="fromL"/>
+          <dgm:param type="vertAlign" val="mid"/>
+          <dgm:param type="nodeHorzAlign" val="l"/>
+          <dgm:param type="nodeVertAlign" val="t"/>
+          <dgm:param type="fallback" val="2D"/>
+        </dgm:alg>
       </dgm:if>
       <dgm:else name="Name3">
         <dgm:alg type="lin">
           <dgm:param type="linDir" val="fromR"/>
+          <dgm:param type="vertAlign" val="mid"/>
+          <dgm:param type="nodeHorzAlign" val="r"/>
+          <dgm:param type="nodeVertAlign" val="t"/>
+          <dgm:param type="fallback" val="2D"/>
         </dgm:alg>
       </dgm:else>
     </dgm:choose>
@@ -2001,217 +2057,146 @@
       <dgm:adjLst/>
     </dgm:shape>
     <dgm:presOf/>
-    <dgm:choose name="Name4">
-      <dgm:if name="Name5" axis="des" func="maxDepth" op="gte" val="2">
-        <dgm:constrLst>
-          <dgm:constr type="h" for="ch" forName="composite" refType="h"/>
-          <dgm:constr type="w" for="ch" forName="composite" refType="w"/>
-          <dgm:constr type="w" for="des" forName="parTx"/>
-          <dgm:constr type="h" for="des" forName="parTx" op="equ"/>
-          <dgm:constr type="w" for="des" forName="desTx"/>
-          <dgm:constr type="h" for="des" forName="desTx" op="equ"/>
-          <dgm:constr type="primFontSz" for="des" forName="parTx" val="65"/>
-          <dgm:constr type="secFontSz" for="des" forName="desTx" refType="primFontSz" refFor="des" refForName="parTx" op="equ"/>
-          <dgm:constr type="h" for="des" forName="parTx" refType="primFontSz" refFor="des" refForName="parTx" fact="1.5"/>
-          <dgm:constr type="h" for="des" forName="desTx" refType="primFontSz" refFor="des" refForName="parTx" fact="0.5"/>
-          <dgm:constr type="w" for="ch" forName="space" op="equ" val="-6"/>
-        </dgm:constrLst>
-        <dgm:ruleLst>
-          <dgm:rule type="w" for="ch" forName="composite" val="0" fact="NaN" max="NaN"/>
-          <dgm:rule type="primFontSz" for="des" forName="parTx" val="5" fact="NaN" max="NaN"/>
-        </dgm:ruleLst>
-        <dgm:forEach name="Name6" axis="ch" ptType="node">
-          <dgm:layoutNode name="composite">
-            <dgm:alg type="composite"/>
+    <dgm:constrLst>
+      <dgm:constr type="h" for="des" forName="header" refType="h"/>
+      <dgm:constr type="w" for="des" forName="header" refType="h" refFor="des" refForName="header" op="equ" fact="4"/>
+      <dgm:constr type="h" for="des" forName="child" refType="h" refFor="des" refForName="header" op="equ"/>
+      <dgm:constr type="w" for="des" forName="child" refType="w" refFor="des" refForName="header" op="equ"/>
+      <dgm:constr type="w" for="ch" forName="hSp" refType="w" refFor="des" refForName="header" op="equ" fact="0.14"/>
+      <dgm:constr type="h" for="des" forName="parTrans" refType="h" refFor="des" refForName="header" op="equ" fact="0.35"/>
+      <dgm:constr type="h" for="des" forName="sibTrans" refType="h" refFor="des" refForName="parTrans" op="equ"/>
+      <dgm:constr type="primFontSz" for="des" forName="child" op="equ" val="65"/>
+      <dgm:constr type="primFontSz" for="des" forName="header" op="equ" val="65"/>
+    </dgm:constrLst>
+    <dgm:ruleLst/>
+    <dgm:forEach name="Name4" axis="ch" ptType="node">
+      <dgm:layoutNode name="vertFlow">
+        <dgm:choose name="Name5">
+          <dgm:if name="Name6" func="var" arg="dir" op="equ" val="norm">
+            <dgm:alg type="lin">
+              <dgm:param type="linDir" val="fromT"/>
+              <dgm:param type="nodeHorzAlign" val="ctr"/>
+              <dgm:param type="nodeVertAlign" val="t"/>
+              <dgm:param type="fallback" val="2D"/>
+            </dgm:alg>
+          </dgm:if>
+          <dgm:else name="Name7">
+            <dgm:alg type="lin">
+              <dgm:param type="linDir" val="fromT"/>
+              <dgm:param type="nodeHorzAlign" val="ctr"/>
+              <dgm:param type="nodeVertAlign" val="t"/>
+              <dgm:param type="fallback" val="2D"/>
+            </dgm:alg>
+          </dgm:else>
+        </dgm:choose>
+        <dgm:shape xmlns:r="http://schemas.openxmlformats.org/officeDocument/2006/relationships" r:blip="">
+          <dgm:adjLst/>
+        </dgm:shape>
+        <dgm:presOf/>
+        <dgm:constrLst/>
+        <dgm:ruleLst/>
+        <dgm:layoutNode name="header" styleLbl="node1">
+          <dgm:alg type="tx"/>
+          <dgm:shape xmlns:r="http://schemas.openxmlformats.org/officeDocument/2006/relationships" type="roundRect" r:blip="">
+            <dgm:adjLst>
+              <dgm:adj idx="1" val="0.1"/>
+            </dgm:adjLst>
+          </dgm:shape>
+          <dgm:presOf axis="self"/>
+          <dgm:constrLst>
+            <dgm:constr type="tMarg" refType="primFontSz" fact="0.1"/>
+            <dgm:constr type="bMarg" refType="primFontSz" fact="0.1"/>
+            <dgm:constr type="lMarg" refType="primFontSz" fact="0.1"/>
+            <dgm:constr type="rMarg" refType="primFontSz" fact="0.1"/>
+          </dgm:constrLst>
+          <dgm:ruleLst>
+            <dgm:rule type="primFontSz" val="5" fact="NaN" max="NaN"/>
+          </dgm:ruleLst>
+        </dgm:layoutNode>
+        <dgm:forEach name="Name8" axis="ch" ptType="parTrans" cnt="1">
+          <dgm:layoutNode name="parTrans" styleLbl="sibTrans2D1">
+            <dgm:alg type="conn">
+              <dgm:param type="begPts" val="auto"/>
+              <dgm:param type="endPts" val="auto"/>
+            </dgm:alg>
+            <dgm:shape xmlns:r="http://schemas.openxmlformats.org/officeDocument/2006/relationships" type="conn" r:blip="">
+              <dgm:adjLst/>
+            </dgm:shape>
+            <dgm:presOf axis="self"/>
+            <dgm:constrLst>
+              <dgm:constr type="w" refType="h"/>
+              <dgm:constr type="connDist"/>
+              <dgm:constr type="wArH" refType="h" fact="0.25"/>
+              <dgm:constr type="hArH" refType="wArH" fact="2"/>
+              <dgm:constr type="stemThick" refType="hArH" fact="0.667"/>
+              <dgm:constr type="begPad" refType="connDist" fact="0.25"/>
+              <dgm:constr type="endPad" refType="connDist" fact="0.25"/>
+            </dgm:constrLst>
+            <dgm:ruleLst/>
+          </dgm:layoutNode>
+        </dgm:forEach>
+        <dgm:forEach name="Name9" axis="ch" ptType="node">
+          <dgm:layoutNode name="child" styleLbl="alignAccFollowNode1">
+            <dgm:varLst>
+              <dgm:chMax val="0"/>
+              <dgm:bulletEnabled val="1"/>
+            </dgm:varLst>
+            <dgm:alg type="tx"/>
+            <dgm:shape xmlns:r="http://schemas.openxmlformats.org/officeDocument/2006/relationships" type="roundRect" r:blip="">
+              <dgm:adjLst>
+                <dgm:adj idx="1" val="0.1"/>
+              </dgm:adjLst>
+            </dgm:shape>
+            <dgm:presOf axis="desOrSelf" ptType="node"/>
+            <dgm:constrLst>
+              <dgm:constr type="tMarg" refType="primFontSz" fact="0.1"/>
+              <dgm:constr type="bMarg" refType="primFontSz" fact="0.1"/>
+              <dgm:constr type="lMarg" refType="primFontSz" fact="0.1"/>
+              <dgm:constr type="rMarg" refType="primFontSz" fact="0.1"/>
+            </dgm:constrLst>
+            <dgm:ruleLst>
+              <dgm:rule type="primFontSz" val="5" fact="NaN" max="NaN"/>
+            </dgm:ruleLst>
+          </dgm:layoutNode>
+          <dgm:forEach name="Name10" axis="followSib" ptType="sibTrans" cnt="1">
+            <dgm:layoutNode name="sibTrans" styleLbl="sibTrans2D1">
+              <dgm:alg type="conn">
+                <dgm:param type="begPts" val="auto"/>
+                <dgm:param type="endPts" val="auto"/>
+              </dgm:alg>
+              <dgm:shape xmlns:r="http://schemas.openxmlformats.org/officeDocument/2006/relationships" type="conn" r:blip="">
+                <dgm:adjLst/>
+              </dgm:shape>
+              <dgm:presOf axis="self"/>
+              <dgm:constrLst>
+                <dgm:constr type="w" refType="h"/>
+                <dgm:constr type="connDist"/>
+                <dgm:constr type="wArH" refType="h" fact="0.25"/>
+                <dgm:constr type="hArH" refType="wArH" fact="2"/>
+                <dgm:constr type="stemThick" refType="hArH" fact="0.667"/>
+                <dgm:constr type="begPad" refType="w" fact="0.25"/>
+                <dgm:constr type="endPad" refType="w" fact="0.25"/>
+              </dgm:constrLst>
+              <dgm:ruleLst/>
+            </dgm:layoutNode>
+          </dgm:forEach>
+        </dgm:forEach>
+      </dgm:layoutNode>
+      <dgm:choose name="Name11">
+        <dgm:if name="Name12" axis="self" ptType="node" func="revPos" op="gte" val="2">
+          <dgm:layoutNode name="hSp">
+            <dgm:alg type="sp"/>
             <dgm:shape xmlns:r="http://schemas.openxmlformats.org/officeDocument/2006/relationships" r:blip="">
               <dgm:adjLst/>
             </dgm:shape>
             <dgm:presOf/>
-            <dgm:choose name="Name7">
-              <dgm:if name="Name8" func="var" arg="dir" op="equ" val="norm">
-                <dgm:constrLst>
-                  <dgm:constr type="l" for="ch" forName="parTx"/>
-                  <dgm:constr type="w" for="ch" forName="parTx" refType="w"/>
-                  <dgm:constr type="t" for="ch" forName="parTx"/>
-                  <dgm:constr type="l" for="ch" forName="desTx"/>
-                  <dgm:constr type="w" for="ch" forName="desTx" refType="w" refFor="ch" refForName="parTx" fact="0.8"/>
-                  <dgm:constr type="t" for="ch" forName="desTx" refType="h" refFor="ch" refForName="parTx" fact="1.125"/>
-                </dgm:constrLst>
-              </dgm:if>
-              <dgm:else name="Name9">
-                <dgm:constrLst>
-                  <dgm:constr type="l" for="ch" forName="parTx"/>
-                  <dgm:constr type="w" for="ch" forName="parTx" refType="w"/>
-                  <dgm:constr type="t" for="ch" forName="parTx"/>
-                  <dgm:constr type="l" for="ch" forName="desTx" refType="w" fact="0.2"/>
-                  <dgm:constr type="w" for="ch" forName="desTx" refType="w" refFor="ch" refForName="parTx" fact="0.8"/>
-                  <dgm:constr type="t" for="ch" forName="desTx" refType="h" refFor="ch" refForName="parTx" fact="1.125"/>
-                </dgm:constrLst>
-              </dgm:else>
-            </dgm:choose>
-            <dgm:ruleLst>
-              <dgm:rule type="h" val="INF" fact="NaN" max="NaN"/>
-            </dgm:ruleLst>
-            <dgm:layoutNode name="parTx">
-              <dgm:varLst>
-                <dgm:chMax val="0"/>
-                <dgm:chPref val="0"/>
-                <dgm:bulletEnabled val="1"/>
-              </dgm:varLst>
-              <dgm:alg type="tx"/>
-              <dgm:choose name="Name10">
-                <dgm:if name="Name11" func="var" arg="dir" op="equ" val="norm">
-                  <dgm:shape xmlns:r="http://schemas.openxmlformats.org/officeDocument/2006/relationships" type="chevron" r:blip="">
-                    <dgm:adjLst/>
-                  </dgm:shape>
-                </dgm:if>
-                <dgm:else name="Name12">
-                  <dgm:shape xmlns:r="http://schemas.openxmlformats.org/officeDocument/2006/relationships" rot="180" type="chevron" r:blip="">
-                    <dgm:adjLst/>
-                  </dgm:shape>
-                </dgm:else>
-              </dgm:choose>
-              <dgm:presOf axis="self" ptType="node"/>
-              <dgm:choose name="Name13">
-                <dgm:if name="Name14" func="var" arg="dir" op="equ" val="norm">
-                  <dgm:constrLst>
-                    <dgm:constr type="h" refType="w" op="lte" fact="0.4"/>
-                    <dgm:constr type="h"/>
-                    <dgm:constr type="tMarg" refType="primFontSz" fact="0.105"/>
-                    <dgm:constr type="bMarg" refType="primFontSz" fact="0.105"/>
-                    <dgm:constr type="lMarg" refType="primFontSz" fact="0.315"/>
-                    <dgm:constr type="rMarg" refType="primFontSz" fact="0.105"/>
-                  </dgm:constrLst>
-                </dgm:if>
-                <dgm:else name="Name15">
-                  <dgm:constrLst>
-                    <dgm:constr type="h" refType="w" op="lte" fact="0.4"/>
-                    <dgm:constr type="h"/>
-                    <dgm:constr type="tMarg" refType="primFontSz" fact="0.105"/>
-                    <dgm:constr type="bMarg" refType="primFontSz" fact="0.105"/>
-                    <dgm:constr type="lMarg" refType="primFontSz" fact="0.105"/>
-                    <dgm:constr type="rMarg" refType="primFontSz" fact="0.315"/>
-                  </dgm:constrLst>
-                </dgm:else>
-              </dgm:choose>
-              <dgm:ruleLst>
-                <dgm:rule type="h" val="INF" fact="NaN" max="NaN"/>
-              </dgm:ruleLst>
-            </dgm:layoutNode>
-            <dgm:layoutNode name="desTx" styleLbl="revTx">
-              <dgm:varLst>
-                <dgm:bulletEnabled val="1"/>
-              </dgm:varLst>
-              <dgm:alg type="tx">
-                <dgm:param type="stBulletLvl" val="1"/>
-              </dgm:alg>
-              <dgm:choose name="Name16">
-                <dgm:if name="Name17" axis="ch" ptType="node" func="cnt" op="gte" val="1">
-                  <dgm:shape xmlns:r="http://schemas.openxmlformats.org/officeDocument/2006/relationships" type="rect" r:blip="">
-                    <dgm:adjLst/>
-                  </dgm:shape>
-                </dgm:if>
-                <dgm:else name="Name18">
-                  <dgm:shape xmlns:r="http://schemas.openxmlformats.org/officeDocument/2006/relationships" type="rect" r:blip="" hideGeom="1">
-                    <dgm:adjLst/>
-                  </dgm:shape>
-                </dgm:else>
-              </dgm:choose>
-              <dgm:presOf axis="des" ptType="node"/>
-              <dgm:constrLst>
-                <dgm:constr type="secFontSz" val="65"/>
-                <dgm:constr type="primFontSz" refType="secFontSz"/>
-                <dgm:constr type="h"/>
-                <dgm:constr type="tMarg"/>
-                <dgm:constr type="bMarg"/>
-                <dgm:constr type="rMarg"/>
-                <dgm:constr type="lMarg"/>
-              </dgm:constrLst>
-              <dgm:ruleLst>
-                <dgm:rule type="h" val="INF" fact="NaN" max="NaN"/>
-              </dgm:ruleLst>
-            </dgm:layoutNode>
+            <dgm:constrLst/>
+            <dgm:ruleLst/>
           </dgm:layoutNode>
-          <dgm:forEach name="Name19" axis="followSib" ptType="sibTrans" cnt="1">
-            <dgm:layoutNode name="space">
-              <dgm:alg type="sp"/>
-              <dgm:shape xmlns:r="http://schemas.openxmlformats.org/officeDocument/2006/relationships" r:blip="">
-                <dgm:adjLst/>
-              </dgm:shape>
-              <dgm:presOf/>
-              <dgm:constrLst/>
-              <dgm:ruleLst/>
-            </dgm:layoutNode>
-          </dgm:forEach>
-        </dgm:forEach>
-      </dgm:if>
-      <dgm:else name="Name20">
-        <dgm:constrLst>
-          <dgm:constr type="w" for="ch" forName="parTxOnly" refType="w"/>
-          <dgm:constr type="h" for="des" forName="parTxOnly" op="equ"/>
-          <dgm:constr type="primFontSz" for="des" forName="parTxOnly" op="equ" val="65"/>
-          <dgm:constr type="w" for="ch" forName="parTxOnlySpace" refType="w" refFor="ch" refForName="parTxOnly" fact="-0.1"/>
-        </dgm:constrLst>
-        <dgm:ruleLst/>
-        <dgm:forEach name="Name21" axis="ch" ptType="node">
-          <dgm:layoutNode name="parTxOnly">
-            <dgm:varLst>
-              <dgm:chMax val="0"/>
-              <dgm:chPref val="0"/>
-              <dgm:bulletEnabled val="1"/>
-            </dgm:varLst>
-            <dgm:alg type="tx"/>
-            <dgm:choose name="Name22">
-              <dgm:if name="Name23" func="var" arg="dir" op="equ" val="norm">
-                <dgm:shape xmlns:r="http://schemas.openxmlformats.org/officeDocument/2006/relationships" type="chevron" r:blip="">
-                  <dgm:adjLst/>
-                </dgm:shape>
-              </dgm:if>
-              <dgm:else name="Name24">
-                <dgm:shape xmlns:r="http://schemas.openxmlformats.org/officeDocument/2006/relationships" rot="180" type="chevron" r:blip="">
-                  <dgm:adjLst/>
-                </dgm:shape>
-              </dgm:else>
-            </dgm:choose>
-            <dgm:presOf axis="self" ptType="node"/>
-            <dgm:choose name="Name25">
-              <dgm:if name="Name26" func="var" arg="dir" op="equ" val="norm">
-                <dgm:constrLst>
-                  <dgm:constr type="h" refType="w" op="equ" fact="0.4"/>
-                  <dgm:constr type="tMarg" refType="primFontSz" fact="0.105"/>
-                  <dgm:constr type="bMarg" refType="primFontSz" fact="0.105"/>
-                  <dgm:constr type="lMarg" refType="primFontSz" fact="0.315"/>
-                  <dgm:constr type="rMarg" refType="primFontSz" fact="0.105"/>
-                </dgm:constrLst>
-              </dgm:if>
-              <dgm:else name="Name27">
-                <dgm:constrLst>
-                  <dgm:constr type="h" refType="w" op="equ" fact="0.4"/>
-                  <dgm:constr type="tMarg" refType="primFontSz" fact="0.105"/>
-                  <dgm:constr type="bMarg" refType="primFontSz" fact="0.105"/>
-                  <dgm:constr type="lMarg" refType="primFontSz" fact="0.105"/>
-                  <dgm:constr type="rMarg" refType="primFontSz" fact="0.315"/>
-                </dgm:constrLst>
-              </dgm:else>
-            </dgm:choose>
-            <dgm:ruleLst>
-              <dgm:rule type="primFontSz" val="5" fact="NaN" max="NaN"/>
-            </dgm:ruleLst>
-          </dgm:layoutNode>
-          <dgm:forEach name="Name28" axis="followSib" ptType="sibTrans" cnt="1">
-            <dgm:layoutNode name="parTxOnlySpace">
-              <dgm:alg type="sp"/>
-              <dgm:shape xmlns:r="http://schemas.openxmlformats.org/officeDocument/2006/relationships" r:blip="">
-                <dgm:adjLst/>
-              </dgm:shape>
-              <dgm:presOf/>
-              <dgm:constrLst/>
-              <dgm:ruleLst/>
-            </dgm:layoutNode>
-          </dgm:forEach>
-        </dgm:forEach>
-      </dgm:else>
-    </dgm:choose>
+        </dgm:if>
+        <dgm:else name="Name13"/>
+      </dgm:choose>
+    </dgm:forEach>
   </dgm:layoutNode>
 </dgm:layoutDef>
 </file>
@@ -8374,7 +8359,7 @@
           <p:nvPr>
             <p:extLst>
               <p:ext uri="{D42A27DB-BD31-4B8C-83A1-F6EECF244321}">
-                <p14:modId xmlns:p14="http://schemas.microsoft.com/office/powerpoint/2010/main" val="1431034086"/>
+                <p14:modId xmlns:p14="http://schemas.microsoft.com/office/powerpoint/2010/main" val="1580825448"/>
               </p:ext>
             </p:extLst>
           </p:nvPr>
@@ -8389,6 +8374,201 @@
           </a:graphicData>
         </a:graphic>
       </p:graphicFrame>
+      <p:cxnSp>
+        <p:nvCxnSpPr>
+          <p:cNvPr id="3" name="Straight Arrow Connector 2">
+            <a:extLst>
+              <a:ext uri="{FF2B5EF4-FFF2-40B4-BE49-F238E27FC236}">
+                <a16:creationId xmlns:a16="http://schemas.microsoft.com/office/drawing/2014/main" id="{08053E19-C064-45F6-AC4F-28E44F240644}"/>
+              </a:ext>
+            </a:extLst>
+          </p:cNvPr>
+          <p:cNvCxnSpPr/>
+          <p:nvPr/>
+        </p:nvCxnSpPr>
+        <p:spPr>
+          <a:xfrm>
+            <a:off x="1437774" y="457200"/>
+            <a:ext cx="180473" cy="0"/>
+          </a:xfrm>
+          <a:prstGeom prst="straightConnector1">
+            <a:avLst/>
+          </a:prstGeom>
+          <a:ln w="19050">
+            <a:tailEnd type="arrow" w="lg" len="med"/>
+          </a:ln>
+        </p:spPr>
+        <p:style>
+          <a:lnRef idx="1">
+            <a:schemeClr val="dk1"/>
+          </a:lnRef>
+          <a:fillRef idx="0">
+            <a:schemeClr val="dk1"/>
+          </a:fillRef>
+          <a:effectRef idx="0">
+            <a:schemeClr val="dk1"/>
+          </a:effectRef>
+          <a:fontRef idx="minor">
+            <a:schemeClr val="tx1"/>
+          </a:fontRef>
+        </p:style>
+      </p:cxnSp>
+      <p:cxnSp>
+        <p:nvCxnSpPr>
+          <p:cNvPr id="5" name="Straight Arrow Connector 4">
+            <a:extLst>
+              <a:ext uri="{FF2B5EF4-FFF2-40B4-BE49-F238E27FC236}">
+                <a16:creationId xmlns:a16="http://schemas.microsoft.com/office/drawing/2014/main" id="{6B74FDA2-6AC4-44C2-BE72-CF30CAC7B300}"/>
+              </a:ext>
+            </a:extLst>
+          </p:cNvPr>
+          <p:cNvCxnSpPr/>
+          <p:nvPr/>
+        </p:nvCxnSpPr>
+        <p:spPr>
+          <a:xfrm>
+            <a:off x="2954685" y="457200"/>
+            <a:ext cx="180473" cy="0"/>
+          </a:xfrm>
+          <a:prstGeom prst="straightConnector1">
+            <a:avLst/>
+          </a:prstGeom>
+          <a:ln w="19050">
+            <a:tailEnd type="arrow" w="lg" len="med"/>
+          </a:ln>
+        </p:spPr>
+        <p:style>
+          <a:lnRef idx="1">
+            <a:schemeClr val="dk1"/>
+          </a:lnRef>
+          <a:fillRef idx="0">
+            <a:schemeClr val="dk1"/>
+          </a:fillRef>
+          <a:effectRef idx="0">
+            <a:schemeClr val="dk1"/>
+          </a:effectRef>
+          <a:fontRef idx="minor">
+            <a:schemeClr val="tx1"/>
+          </a:fontRef>
+        </p:style>
+      </p:cxnSp>
+      <p:cxnSp>
+        <p:nvCxnSpPr>
+          <p:cNvPr id="6" name="Straight Arrow Connector 5">
+            <a:extLst>
+              <a:ext uri="{FF2B5EF4-FFF2-40B4-BE49-F238E27FC236}">
+                <a16:creationId xmlns:a16="http://schemas.microsoft.com/office/drawing/2014/main" id="{BCBB3A80-15A0-45D6-AF68-834B562A7882}"/>
+              </a:ext>
+            </a:extLst>
+          </p:cNvPr>
+          <p:cNvCxnSpPr/>
+          <p:nvPr/>
+        </p:nvCxnSpPr>
+        <p:spPr>
+          <a:xfrm>
+            <a:off x="4481763" y="457200"/>
+            <a:ext cx="180473" cy="0"/>
+          </a:xfrm>
+          <a:prstGeom prst="straightConnector1">
+            <a:avLst/>
+          </a:prstGeom>
+          <a:ln w="19050">
+            <a:tailEnd type="arrow" w="lg" len="med"/>
+          </a:ln>
+        </p:spPr>
+        <p:style>
+          <a:lnRef idx="1">
+            <a:schemeClr val="dk1"/>
+          </a:lnRef>
+          <a:fillRef idx="0">
+            <a:schemeClr val="dk1"/>
+          </a:fillRef>
+          <a:effectRef idx="0">
+            <a:schemeClr val="dk1"/>
+          </a:effectRef>
+          <a:fontRef idx="minor">
+            <a:schemeClr val="tx1"/>
+          </a:fontRef>
+        </p:style>
+      </p:cxnSp>
+      <p:cxnSp>
+        <p:nvCxnSpPr>
+          <p:cNvPr id="7" name="Straight Arrow Connector 6">
+            <a:extLst>
+              <a:ext uri="{FF2B5EF4-FFF2-40B4-BE49-F238E27FC236}">
+                <a16:creationId xmlns:a16="http://schemas.microsoft.com/office/drawing/2014/main" id="{99D1BAD8-0C2C-483C-8428-99E03617434C}"/>
+              </a:ext>
+            </a:extLst>
+          </p:cNvPr>
+          <p:cNvCxnSpPr/>
+          <p:nvPr/>
+        </p:nvCxnSpPr>
+        <p:spPr>
+          <a:xfrm>
+            <a:off x="5998674" y="457200"/>
+            <a:ext cx="180473" cy="0"/>
+          </a:xfrm>
+          <a:prstGeom prst="straightConnector1">
+            <a:avLst/>
+          </a:prstGeom>
+          <a:ln w="19050">
+            <a:tailEnd type="arrow" w="lg" len="med"/>
+          </a:ln>
+        </p:spPr>
+        <p:style>
+          <a:lnRef idx="1">
+            <a:schemeClr val="dk1"/>
+          </a:lnRef>
+          <a:fillRef idx="0">
+            <a:schemeClr val="dk1"/>
+          </a:fillRef>
+          <a:effectRef idx="0">
+            <a:schemeClr val="dk1"/>
+          </a:effectRef>
+          <a:fontRef idx="minor">
+            <a:schemeClr val="tx1"/>
+          </a:fontRef>
+        </p:style>
+      </p:cxnSp>
+      <p:cxnSp>
+        <p:nvCxnSpPr>
+          <p:cNvPr id="8" name="Straight Arrow Connector 7">
+            <a:extLst>
+              <a:ext uri="{FF2B5EF4-FFF2-40B4-BE49-F238E27FC236}">
+                <a16:creationId xmlns:a16="http://schemas.microsoft.com/office/drawing/2014/main" id="{801B4888-9EF1-45D2-AC13-EE6B61A852C4}"/>
+              </a:ext>
+            </a:extLst>
+          </p:cNvPr>
+          <p:cNvCxnSpPr/>
+          <p:nvPr/>
+        </p:nvCxnSpPr>
+        <p:spPr>
+          <a:xfrm>
+            <a:off x="7529763" y="457200"/>
+            <a:ext cx="180473" cy="0"/>
+          </a:xfrm>
+          <a:prstGeom prst="straightConnector1">
+            <a:avLst/>
+          </a:prstGeom>
+          <a:ln w="19050">
+            <a:tailEnd type="arrow" w="lg" len="med"/>
+          </a:ln>
+        </p:spPr>
+        <p:style>
+          <a:lnRef idx="1">
+            <a:schemeClr val="dk1"/>
+          </a:lnRef>
+          <a:fillRef idx="0">
+            <a:schemeClr val="dk1"/>
+          </a:fillRef>
+          <a:effectRef idx="0">
+            <a:schemeClr val="dk1"/>
+          </a:effectRef>
+          <a:fontRef idx="minor">
+            <a:schemeClr val="tx1"/>
+          </a:fontRef>
+        </p:style>
+      </p:cxnSp>
     </p:spTree>
     <p:extLst>
       <p:ext uri="{BB962C8B-B14F-4D97-AF65-F5344CB8AC3E}">

</xml_diff>